<commit_message>
Atualiza escopo exercicios bd
</commit_message>
<xml_diff>
--- a/sprint-1-bd/aulas/Aula_07_BD.pptx
+++ b/sprint-1-bd/aulas/Aula_07_BD.pptx
@@ -5475,8 +5475,12 @@
           <a:lstStyle/>
           <a:p>
             <a:r>
+              <a:rPr lang="pt-BR"/>
+              <a:t>FULL OUTER </a:t>
+            </a:r>
+            <a:r>
               <a:rPr lang="pt-BR" dirty="0"/>
-              <a:t>INNER JOIN</a:t>
+              <a:t>JOIN</a:t>
             </a:r>
           </a:p>
         </p:txBody>
@@ -6945,21 +6949,6 @@
 </file>
 
 <file path=customXml/item1.xml><?xml version="1.0" encoding="utf-8"?>
-<p:properties xmlns:p="http://schemas.microsoft.com/office/2006/metadata/properties" xmlns:xsi="http://www.w3.org/2001/XMLSchema-instance" xmlns:pc="http://schemas.microsoft.com/office/infopath/2007/PartnerControls">
-  <documentManagement/>
-</p:properties>
-</file>
-
-<file path=customXml/item2.xml><?xml version="1.0" encoding="utf-8"?>
-<?mso-contentType ?>
-<FormTemplates xmlns="http://schemas.microsoft.com/sharepoint/v3/contenttype/forms">
-  <Display>DocumentLibraryForm</Display>
-  <Edit>DocumentLibraryForm</Edit>
-  <New>DocumentLibraryForm</New>
-</FormTemplates>
-</file>
-
-<file path=customXml/item3.xml><?xml version="1.0" encoding="utf-8"?>
 <ct:contentTypeSchema xmlns:ct="http://schemas.microsoft.com/office/2006/metadata/contentType" xmlns:ma="http://schemas.microsoft.com/office/2006/metadata/properties/metaAttributes" ct:_="" ma:_="" ma:contentTypeName="Documento" ma:contentTypeID="0x0101001C0BDCB75C490F449996D271113E7085" ma:contentTypeVersion="12" ma:contentTypeDescription="Crie um novo documento." ma:contentTypeScope="" ma:versionID="f78031fe7deaa61be8293be56c3571d3">
   <xsd:schema xmlns:xsd="http://www.w3.org/2001/XMLSchema" xmlns:xs="http://www.w3.org/2001/XMLSchema" xmlns:p="http://schemas.microsoft.com/office/2006/metadata/properties" xmlns:ns2="56135199-fddc-46f9-8522-4d2f2df906d6" xmlns:ns3="616ddcb6-37a4-4b68-9e62-eadd2126515b" targetNamespace="http://schemas.microsoft.com/office/2006/metadata/properties" ma:root="true" ma:fieldsID="84b82f449ed318020166b0b852c53661" ns2:_="" ns3:_="">
     <xsd:import namespace="56135199-fddc-46f9-8522-4d2f2df906d6"/>
@@ -7176,24 +7165,22 @@
 </ct:contentTypeSchema>
 </file>
 
-<file path=customXml/itemProps1.xml><?xml version="1.0" encoding="utf-8"?>
-<ds:datastoreItem xmlns:ds="http://schemas.openxmlformats.org/officeDocument/2006/customXml" ds:itemID="{7598036D-8F24-4150-8883-4040B39D685E}">
-  <ds:schemaRefs>
-    <ds:schemaRef ds:uri="http://schemas.microsoft.com/office/2006/metadata/properties"/>
-    <ds:schemaRef ds:uri="http://schemas.microsoft.com/office/infopath/2007/PartnerControls"/>
-  </ds:schemaRefs>
-</ds:datastoreItem>
+<file path=customXml/item2.xml><?xml version="1.0" encoding="utf-8"?>
+<?mso-contentType ?>
+<FormTemplates xmlns="http://schemas.microsoft.com/sharepoint/v3/contenttype/forms">
+  <Display>DocumentLibraryForm</Display>
+  <Edit>DocumentLibraryForm</Edit>
+  <New>DocumentLibraryForm</New>
+</FormTemplates>
 </file>
 
-<file path=customXml/itemProps2.xml><?xml version="1.0" encoding="utf-8"?>
-<ds:datastoreItem xmlns:ds="http://schemas.openxmlformats.org/officeDocument/2006/customXml" ds:itemID="{8AEFDE86-9ABD-4B53-9EB0-611E0710241D}">
-  <ds:schemaRefs>
-    <ds:schemaRef ds:uri="http://schemas.microsoft.com/sharepoint/v3/contenttype/forms"/>
-  </ds:schemaRefs>
-</ds:datastoreItem>
+<file path=customXml/item3.xml><?xml version="1.0" encoding="utf-8"?>
+<p:properties xmlns:p="http://schemas.microsoft.com/office/2006/metadata/properties" xmlns:xsi="http://www.w3.org/2001/XMLSchema-instance" xmlns:pc="http://schemas.microsoft.com/office/infopath/2007/PartnerControls">
+  <documentManagement/>
+</p:properties>
 </file>
 
-<file path=customXml/itemProps3.xml><?xml version="1.0" encoding="utf-8"?>
+<file path=customXml/itemProps1.xml><?xml version="1.0" encoding="utf-8"?>
 <ds:datastoreItem xmlns:ds="http://schemas.openxmlformats.org/officeDocument/2006/customXml" ds:itemID="{DD46F767-487D-45A7-9383-4F9F29521278}">
   <ds:schemaRefs>
     <ds:schemaRef ds:uri="http://schemas.microsoft.com/office/2006/metadata/contentType"/>
@@ -7210,4 +7197,21 @@
     <ds:schemaRef ds:uri="http://schemas.microsoft.com/internal/obd"/>
   </ds:schemaRefs>
 </ds:datastoreItem>
+</file>
+
+<file path=customXml/itemProps2.xml><?xml version="1.0" encoding="utf-8"?>
+<ds:datastoreItem xmlns:ds="http://schemas.openxmlformats.org/officeDocument/2006/customXml" ds:itemID="{8AEFDE86-9ABD-4B53-9EB0-611E0710241D}">
+  <ds:schemaRefs>
+    <ds:schemaRef ds:uri="http://schemas.microsoft.com/sharepoint/v3/contenttype/forms"/>
+  </ds:schemaRefs>
+</ds:datastoreItem>
+</file>
+
+<file path=customXml/itemProps3.xml><?xml version="1.0" encoding="utf-8"?>
+<ds:datastoreItem xmlns:ds="http://schemas.openxmlformats.org/officeDocument/2006/customXml" ds:itemID="{7598036D-8F24-4150-8883-4040B39D685E}">
+  <ds:schemaRefs>
+    <ds:schemaRef ds:uri="http://schemas.microsoft.com/office/2006/metadata/properties"/>
+    <ds:schemaRef ds:uri="http://schemas.microsoft.com/office/infopath/2007/PartnerControls"/>
+  </ds:schemaRefs>
+</ds:datastoreItem>
 </file>
</xml_diff>